<commit_message>
boot camp -> bootcamp
</commit_message>
<xml_diff>
--- a/archer/Conclusion.pptx
+++ b/archer/Conclusion.pptx
@@ -8731,7 +8731,7 @@
     <mc:Choice Requires="p14">
       <p:transition spd="slow" p14:dur="2000"/>
     </mc:Choice>
-    <mc:Fallback xmlns="" xmlns:mv="urn:schemas-microsoft-com:mac:vml">
+    <mc:Fallback xmlns:mv="urn:schemas-microsoft-com:mac:vml" xmlns="">
       <p:transition spd="slow"/>
     </mc:Fallback>
   </mc:AlternateContent>
@@ -11553,7 +11553,15 @@
             </a:pPr>
             <a:r>
               <a:rPr lang="en-GB" sz="3600" dirty="0" smtClean="0"/>
-              <a:t>What did you think of this boot camp?</a:t>
+              <a:t>What did you think of this </a:t>
+            </a:r>
+            <a:r>
+              <a:rPr lang="en-GB" sz="3600" dirty="0" err="1" smtClean="0"/>
+              <a:t>bootcamp</a:t>
+            </a:r>
+            <a:r>
+              <a:rPr lang="en-GB" sz="3600" dirty="0" smtClean="0"/>
+              <a:t>?</a:t>
             </a:r>
             <a:endParaRPr lang="en-GB" sz="3600" dirty="0"/>
           </a:p>

</xml_diff>